<commit_message>
updated presentation for lesson 06
</commit_message>
<xml_diff>
--- a/lesson06/lesson06.pptx
+++ b/lesson06/lesson06.pptx
@@ -9609,6 +9609,13 @@
   <p:clrMapOvr>
     <a:masterClrMapping/>
   </p:clrMapOvr>
+  <p:timing>
+    <p:tnLst>
+      <p:par>
+        <p:cTn id="1" dur="indefinite" restart="never" nodeType="tmRoot"/>
+      </p:par>
+    </p:tnLst>
+  </p:timing>
 </p:sld>
 </file>
 
@@ -13090,6 +13097,13 @@
   <p:clrMapOvr>
     <a:masterClrMapping/>
   </p:clrMapOvr>
+  <p:timing>
+    <p:tnLst>
+      <p:par>
+        <p:cTn id="1" dur="indefinite" restart="never" nodeType="tmRoot"/>
+      </p:par>
+    </p:tnLst>
+  </p:timing>
 </p:sld>
 </file>
 
@@ -17020,6 +17034,13 @@
     <a:masterClrMapping/>
   </p:clrMapOvr>
   <p:transition/>
+  <p:timing>
+    <p:tnLst>
+      <p:par>
+        <p:cTn id="1" dur="indefinite" restart="never" nodeType="tmRoot"/>
+      </p:par>
+    </p:tnLst>
+  </p:timing>
 </p:sld>
 </file>
 
@@ -17370,15 +17391,21 @@
             <p:ph type="title"/>
           </p:nvPr>
         </p:nvSpPr>
-        <p:spPr/>
+        <p:spPr>
+          <a:xfrm>
+            <a:off x="489141" y="526312"/>
+            <a:ext cx="10820400" cy="685800"/>
+          </a:xfrm>
+        </p:spPr>
         <p:txBody>
           <a:bodyPr/>
           <a:lstStyle/>
           <a:p>
             <a:r>
-              <a:rPr lang="ru-RU" altLang="ru-RU" dirty="0"/>
-              <a:t>Пример  </a:t>
-            </a:r>
+              <a:rPr lang="ru-RU" altLang="ru-RU" dirty="0" smtClean="0"/>
+              <a:t>Универсальный класс?  </a:t>
+            </a:r>
+            <a:endParaRPr lang="ru-RU" altLang="ru-RU" dirty="0"/>
           </a:p>
         </p:txBody>
       </p:sp>
@@ -17400,7 +17427,7 @@
         </p:nvSpPr>
         <p:spPr>
           <a:xfrm>
-            <a:off x="404080" y="1497524"/>
+            <a:off x="370367" y="1531090"/>
             <a:ext cx="10820400" cy="3429000"/>
           </a:xfrm>
         </p:spPr>
@@ -20174,6 +20201,21 @@
 </file>
 
 <file path=customXml/item1.xml><?xml version="1.0" encoding="utf-8"?>
+<p:properties xmlns:p="http://schemas.microsoft.com/office/2006/metadata/properties" xmlns:xsi="http://www.w3.org/2001/XMLSchema-instance" xmlns:pc="http://schemas.microsoft.com/office/infopath/2007/PartnerControls">
+  <documentManagement>
+    <_x041a__x043e__x043c__x0435__x0442__x0430__x0440_ xmlns="835f28f2-30f1-4728-84d2-86d96e143488" xsi:nil="true"/>
+    <SharedWithUsers xmlns="341e6018-ac0a-4dfb-8409-db9e0d25502e">
+      <UserInfo>
+        <DisplayName>Andrew Berman</DisplayName>
+        <AccountId>3588</AccountId>
+        <AccountType/>
+      </UserInfo>
+    </SharedWithUsers>
+  </documentManagement>
+</p:properties>
+</file>
+
+<file path=customXml/item2.xml><?xml version="1.0" encoding="utf-8"?>
 <ct:contentTypeSchema xmlns:ct="http://schemas.microsoft.com/office/2006/metadata/contentType" xmlns:ma="http://schemas.microsoft.com/office/2006/metadata/properties/metaAttributes" ct:_="" ma:_="" ma:contentTypeName="Document" ma:contentTypeID="0x0101004195FC54A15F344D83577B1CDDD67A5D" ma:contentTypeVersion="13" ma:contentTypeDescription="Create a new document." ma:contentTypeScope="" ma:versionID="30ded57c9b2156718eb8cc7b0e4246dc">
   <xsd:schema xmlns:xsd="http://www.w3.org/2001/XMLSchema" xmlns:xs="http://www.w3.org/2001/XMLSchema" xmlns:p="http://schemas.microsoft.com/office/2006/metadata/properties" xmlns:ns2="341e6018-ac0a-4dfb-8409-db9e0d25502e" xmlns:ns3="835f28f2-30f1-4728-84d2-86d96e143488" targetNamespace="http://schemas.microsoft.com/office/2006/metadata/properties" ma:root="true" ma:fieldsID="a0d1831635397921c92a19e568dfc949" ns2:_="" ns3:_="">
     <xsd:import namespace="341e6018-ac0a-4dfb-8409-db9e0d25502e"/>
@@ -20398,21 +20440,6 @@
 </ct:contentTypeSchema>
 </file>
 
-<file path=customXml/item2.xml><?xml version="1.0" encoding="utf-8"?>
-<p:properties xmlns:p="http://schemas.microsoft.com/office/2006/metadata/properties" xmlns:xsi="http://www.w3.org/2001/XMLSchema-instance" xmlns:pc="http://schemas.microsoft.com/office/infopath/2007/PartnerControls">
-  <documentManagement>
-    <_x041a__x043e__x043c__x0435__x0442__x0430__x0440_ xmlns="835f28f2-30f1-4728-84d2-86d96e143488" xsi:nil="true"/>
-    <SharedWithUsers xmlns="341e6018-ac0a-4dfb-8409-db9e0d25502e">
-      <UserInfo>
-        <DisplayName>Andrew Berman</DisplayName>
-        <AccountId>3588</AccountId>
-        <AccountType/>
-      </UserInfo>
-    </SharedWithUsers>
-  </documentManagement>
-</p:properties>
-</file>
-
 <file path=customXml/item3.xml><?xml version="1.0" encoding="utf-8"?>
 <?mso-contentType ?>
 <FormTemplates xmlns="http://schemas.microsoft.com/sharepoint/v3/contenttype/forms">
@@ -20423,6 +20450,17 @@
 </file>
 
 <file path=customXml/itemProps1.xml><?xml version="1.0" encoding="utf-8"?>
+<ds:datastoreItem xmlns:ds="http://schemas.openxmlformats.org/officeDocument/2006/customXml" ds:itemID="{E9033E08-7FE9-4F6D-B155-A8777B4A5A57}">
+  <ds:schemaRefs>
+    <ds:schemaRef ds:uri="http://schemas.microsoft.com/office/2006/metadata/properties"/>
+    <ds:schemaRef ds:uri="http://schemas.microsoft.com/office/infopath/2007/PartnerControls"/>
+    <ds:schemaRef ds:uri="835f28f2-30f1-4728-84d2-86d96e143488"/>
+    <ds:schemaRef ds:uri="341e6018-ac0a-4dfb-8409-db9e0d25502e"/>
+  </ds:schemaRefs>
+</ds:datastoreItem>
+</file>
+
+<file path=customXml/itemProps2.xml><?xml version="1.0" encoding="utf-8"?>
 <ds:datastoreItem xmlns:ds="http://schemas.openxmlformats.org/officeDocument/2006/customXml" ds:itemID="{5C03D7BA-5661-4852-B9A0-05C9D1D048AE}">
   <ds:schemaRefs>
     <ds:schemaRef ds:uri="http://schemas.microsoft.com/office/2006/metadata/contentType"/>
@@ -20441,17 +20479,6 @@
 </ds:datastoreItem>
 </file>
 
-<file path=customXml/itemProps2.xml><?xml version="1.0" encoding="utf-8"?>
-<ds:datastoreItem xmlns:ds="http://schemas.openxmlformats.org/officeDocument/2006/customXml" ds:itemID="{E9033E08-7FE9-4F6D-B155-A8777B4A5A57}">
-  <ds:schemaRefs>
-    <ds:schemaRef ds:uri="http://schemas.microsoft.com/office/2006/metadata/properties"/>
-    <ds:schemaRef ds:uri="http://schemas.microsoft.com/office/infopath/2007/PartnerControls"/>
-    <ds:schemaRef ds:uri="835f28f2-30f1-4728-84d2-86d96e143488"/>
-    <ds:schemaRef ds:uri="341e6018-ac0a-4dfb-8409-db9e0d25502e"/>
-  </ds:schemaRefs>
-</ds:datastoreItem>
-</file>
-
 <file path=customXml/itemProps3.xml><?xml version="1.0" encoding="utf-8"?>
 <ds:datastoreItem xmlns:ds="http://schemas.openxmlformats.org/officeDocument/2006/customXml" ds:itemID="{296B3B9E-03D8-4766-BF45-6129617CF026}">
   <ds:schemaRefs>

</xml_diff>